<commit_message>
feat(screen): new prototypes screen for sell and books
</commit_message>
<xml_diff>
--- a/docs/SEGUNDO_PPT_LES.pptx
+++ b/docs/SEGUNDO_PPT_LES.pptx
@@ -7054,7 +7054,7 @@
             </a:pPr>
             <a:r>
               <a:rPr lang="pt-BR" altLang="pt-BR" sz="3200" b="1" dirty="0"/>
-              <a:t>ENTREGA – 23/08/2025</a:t>
+              <a:t>ENTREGA – 30/08/2025</a:t>
             </a:r>
           </a:p>
         </p:txBody>
@@ -7861,7 +7861,7 @@
         </p:blipFill>
         <p:spPr bwMode="auto">
           <a:xfrm>
-            <a:off x="4815834" y="1093390"/>
+            <a:off x="4922835" y="553161"/>
             <a:ext cx="2898775" cy="1741488"/>
           </a:xfrm>
           <a:prstGeom prst="rect">
@@ -8004,8 +8004,68 @@
         </p:blipFill>
         <p:spPr>
           <a:xfrm>
-            <a:off x="4498975" y="3591030"/>
+            <a:off x="4598446" y="4285878"/>
             <a:ext cx="4067944" cy="2288219"/>
+          </a:xfrm>
+          <a:prstGeom prst="rect">
+            <a:avLst/>
+          </a:prstGeom>
+        </p:spPr>
+      </p:pic>
+      <p:pic>
+        <p:nvPicPr>
+          <p:cNvPr id="3" name="Imagem 2">
+            <a:extLst>
+              <a:ext uri="{FF2B5EF4-FFF2-40B4-BE49-F238E27FC236}">
+                <a16:creationId xmlns:a16="http://schemas.microsoft.com/office/drawing/2014/main" id="{5A8DB519-5C15-0916-3A4E-CBD2BAACFC73}"/>
+              </a:ext>
+            </a:extLst>
+          </p:cNvPr>
+          <p:cNvPicPr>
+            <a:picLocks noChangeAspect="1"/>
+          </p:cNvPicPr>
+          <p:nvPr/>
+        </p:nvPicPr>
+        <p:blipFill>
+          <a:blip r:embed="rId7"/>
+          <a:stretch>
+            <a:fillRect/>
+          </a:stretch>
+        </p:blipFill>
+        <p:spPr>
+          <a:xfrm>
+            <a:off x="3682885" y="2838764"/>
+            <a:ext cx="1591071" cy="1591071"/>
+          </a:xfrm>
+          <a:prstGeom prst="rect">
+            <a:avLst/>
+          </a:prstGeom>
+        </p:spPr>
+      </p:pic>
+      <p:pic>
+        <p:nvPicPr>
+          <p:cNvPr id="5" name="Imagem 4" descr="JavaScript – Wikipédia, a enciclopédia livre">
+            <a:extLst>
+              <a:ext uri="{FF2B5EF4-FFF2-40B4-BE49-F238E27FC236}">
+                <a16:creationId xmlns:a16="http://schemas.microsoft.com/office/drawing/2014/main" id="{206B208F-B4E9-9B6F-9065-03F8BB3BF1B5}"/>
+              </a:ext>
+            </a:extLst>
+          </p:cNvPr>
+          <p:cNvPicPr>
+            <a:picLocks noChangeAspect="1"/>
+          </p:cNvPicPr>
+          <p:nvPr/>
+        </p:nvPicPr>
+        <p:blipFill>
+          <a:blip r:embed="rId8"/>
+          <a:stretch>
+            <a:fillRect/>
+          </a:stretch>
+        </p:blipFill>
+        <p:spPr>
+          <a:xfrm>
+            <a:off x="6397377" y="2750237"/>
+            <a:ext cx="1589335" cy="1589335"/>
           </a:xfrm>
           <a:prstGeom prst="rect">
             <a:avLst/>
@@ -8330,7 +8390,7 @@
             </a:pPr>
             <a:r>
               <a:rPr lang="pt-BR" altLang="pt-BR" sz="3200" b="1" dirty="0"/>
-              <a:t>ENTREGA – 26/08/2025</a:t>
+              <a:t>ENTREGA – 30/08/2025</a:t>
             </a:r>
           </a:p>
         </p:txBody>

</xml_diff>